<commit_message>
update opengl chap 10
</commit_message>
<xml_diff>
--- a/OpenGLProgrammingGuide_10_yifeih.pptx
+++ b/OpenGLProgrammingGuide_10_yifeih.pptx
@@ -231,7 +231,7 @@
           <a:p>
             <a:fld id="{98C6DB72-2C9D-4462-920D-A4EEDEFB2379}" type="datetimeFigureOut">
               <a:rPr lang="en-US" smtClean="0"/>
-              <a:t>5/9/2019</a:t>
+              <a:t>5/10/2019</a:t>
             </a:fld>
             <a:endParaRPr lang="en-US"/>
           </a:p>
@@ -1402,7 +1402,7 @@
           <a:p>
             <a:fld id="{A55BDA75-5386-4D04-B839-B27432556703}" type="datetimeFigureOut">
               <a:rPr lang="en-US" smtClean="0"/>
-              <a:t>5/9/2019</a:t>
+              <a:t>5/10/2019</a:t>
             </a:fld>
             <a:endParaRPr lang="en-US"/>
           </a:p>
@@ -1600,7 +1600,7 @@
           <a:p>
             <a:fld id="{A55BDA75-5386-4D04-B839-B27432556703}" type="datetimeFigureOut">
               <a:rPr lang="en-US" smtClean="0"/>
-              <a:t>5/9/2019</a:t>
+              <a:t>5/10/2019</a:t>
             </a:fld>
             <a:endParaRPr lang="en-US"/>
           </a:p>
@@ -1808,7 +1808,7 @@
           <a:p>
             <a:fld id="{A55BDA75-5386-4D04-B839-B27432556703}" type="datetimeFigureOut">
               <a:rPr lang="en-US" smtClean="0"/>
-              <a:t>5/9/2019</a:t>
+              <a:t>5/10/2019</a:t>
             </a:fld>
             <a:endParaRPr lang="en-US"/>
           </a:p>
@@ -2006,7 +2006,7 @@
           <a:p>
             <a:fld id="{A55BDA75-5386-4D04-B839-B27432556703}" type="datetimeFigureOut">
               <a:rPr lang="en-US" smtClean="0"/>
-              <a:t>5/9/2019</a:t>
+              <a:t>5/10/2019</a:t>
             </a:fld>
             <a:endParaRPr lang="en-US"/>
           </a:p>
@@ -2281,7 +2281,7 @@
           <a:p>
             <a:fld id="{A55BDA75-5386-4D04-B839-B27432556703}" type="datetimeFigureOut">
               <a:rPr lang="en-US" smtClean="0"/>
-              <a:t>5/9/2019</a:t>
+              <a:t>5/10/2019</a:t>
             </a:fld>
             <a:endParaRPr lang="en-US"/>
           </a:p>
@@ -2546,7 +2546,7 @@
           <a:p>
             <a:fld id="{A55BDA75-5386-4D04-B839-B27432556703}" type="datetimeFigureOut">
               <a:rPr lang="en-US" smtClean="0"/>
-              <a:t>5/9/2019</a:t>
+              <a:t>5/10/2019</a:t>
             </a:fld>
             <a:endParaRPr lang="en-US"/>
           </a:p>
@@ -2958,7 +2958,7 @@
           <a:p>
             <a:fld id="{A55BDA75-5386-4D04-B839-B27432556703}" type="datetimeFigureOut">
               <a:rPr lang="en-US" smtClean="0"/>
-              <a:t>5/9/2019</a:t>
+              <a:t>5/10/2019</a:t>
             </a:fld>
             <a:endParaRPr lang="en-US"/>
           </a:p>
@@ -3099,7 +3099,7 @@
           <a:p>
             <a:fld id="{A55BDA75-5386-4D04-B839-B27432556703}" type="datetimeFigureOut">
               <a:rPr lang="en-US" smtClean="0"/>
-              <a:t>5/9/2019</a:t>
+              <a:t>5/10/2019</a:t>
             </a:fld>
             <a:endParaRPr lang="en-US"/>
           </a:p>
@@ -3212,7 +3212,7 @@
           <a:p>
             <a:fld id="{A55BDA75-5386-4D04-B839-B27432556703}" type="datetimeFigureOut">
               <a:rPr lang="en-US" smtClean="0"/>
-              <a:t>5/9/2019</a:t>
+              <a:t>5/10/2019</a:t>
             </a:fld>
             <a:endParaRPr lang="en-US"/>
           </a:p>
@@ -3523,7 +3523,7 @@
           <a:p>
             <a:fld id="{A55BDA75-5386-4D04-B839-B27432556703}" type="datetimeFigureOut">
               <a:rPr lang="en-US" smtClean="0"/>
-              <a:t>5/9/2019</a:t>
+              <a:t>5/10/2019</a:t>
             </a:fld>
             <a:endParaRPr lang="en-US"/>
           </a:p>
@@ -3811,7 +3811,7 @@
           <a:p>
             <a:fld id="{A55BDA75-5386-4D04-B839-B27432556703}" type="datetimeFigureOut">
               <a:rPr lang="en-US" smtClean="0"/>
-              <a:t>5/9/2019</a:t>
+              <a:t>5/10/2019</a:t>
             </a:fld>
             <a:endParaRPr lang="en-US"/>
           </a:p>
@@ -4052,7 +4052,7 @@
           <a:p>
             <a:fld id="{A55BDA75-5386-4D04-B839-B27432556703}" type="datetimeFigureOut">
               <a:rPr lang="en-US" smtClean="0"/>
-              <a:t>5/9/2019</a:t>
+              <a:t>5/10/2019</a:t>
             </a:fld>
             <a:endParaRPr lang="en-US"/>
           </a:p>
@@ -4625,7 +4625,7 @@
           <a:bodyPr/>
           <a:lstStyle/>
           <a:p>
-            <a:endParaRPr lang="en-US"/>
+            <a:endParaRPr lang="en-US" dirty="0"/>
           </a:p>
         </p:txBody>
       </p:sp>
@@ -4651,8 +4651,8 @@
         </p:blipFill>
         <p:spPr>
           <a:xfrm>
-            <a:off x="2533650" y="2976562"/>
-            <a:ext cx="7124700" cy="904875"/>
+            <a:off x="406112" y="1543854"/>
+            <a:ext cx="6441394" cy="818091"/>
           </a:xfrm>
           <a:prstGeom prst="rect">
             <a:avLst/>
@@ -4681,14 +4681,199 @@
         </p:blipFill>
         <p:spPr>
           <a:xfrm>
-            <a:off x="2654877" y="4698855"/>
-            <a:ext cx="7277100" cy="847725"/>
+            <a:off x="406112" y="2461047"/>
+            <a:ext cx="6579178" cy="766423"/>
           </a:xfrm>
           <a:prstGeom prst="rect">
             <a:avLst/>
           </a:prstGeom>
         </p:spPr>
       </p:pic>
+      <p:pic>
+        <p:nvPicPr>
+          <p:cNvPr id="7" name="Picture 6">
+            <a:extLst>
+              <a:ext uri="{FF2B5EF4-FFF2-40B4-BE49-F238E27FC236}">
+                <a16:creationId xmlns:a16="http://schemas.microsoft.com/office/drawing/2014/main" id="{A28A062E-E18E-4B0A-B971-8F1941725570}"/>
+              </a:ext>
+            </a:extLst>
+          </p:cNvPr>
+          <p:cNvPicPr>
+            <a:picLocks noChangeAspect="1"/>
+          </p:cNvPicPr>
+          <p:nvPr/>
+        </p:nvPicPr>
+        <p:blipFill>
+          <a:blip r:embed="rId4"/>
+          <a:stretch>
+            <a:fillRect/>
+          </a:stretch>
+        </p:blipFill>
+        <p:spPr>
+          <a:xfrm>
+            <a:off x="7849465" y="4183501"/>
+            <a:ext cx="3936423" cy="2309374"/>
+          </a:xfrm>
+          <a:prstGeom prst="rect">
+            <a:avLst/>
+          </a:prstGeom>
+        </p:spPr>
+      </p:pic>
+      <p:pic>
+        <p:nvPicPr>
+          <p:cNvPr id="8" name="Picture 7">
+            <a:extLst>
+              <a:ext uri="{FF2B5EF4-FFF2-40B4-BE49-F238E27FC236}">
+                <a16:creationId xmlns:a16="http://schemas.microsoft.com/office/drawing/2014/main" id="{99590ABC-F480-47E8-AC25-81E8AB0FA0E2}"/>
+              </a:ext>
+            </a:extLst>
+          </p:cNvPr>
+          <p:cNvPicPr>
+            <a:picLocks noChangeAspect="1"/>
+          </p:cNvPicPr>
+          <p:nvPr/>
+        </p:nvPicPr>
+        <p:blipFill>
+          <a:blip r:embed="rId5"/>
+          <a:stretch>
+            <a:fillRect/>
+          </a:stretch>
+        </p:blipFill>
+        <p:spPr>
+          <a:xfrm>
+            <a:off x="576045" y="3769264"/>
+            <a:ext cx="6787862" cy="2588591"/>
+          </a:xfrm>
+          <a:prstGeom prst="rect">
+            <a:avLst/>
+          </a:prstGeom>
+        </p:spPr>
+      </p:pic>
+      <p:sp>
+        <p:nvSpPr>
+          <p:cNvPr id="9" name="TextBox 8">
+            <a:extLst>
+              <a:ext uri="{FF2B5EF4-FFF2-40B4-BE49-F238E27FC236}">
+                <a16:creationId xmlns:a16="http://schemas.microsoft.com/office/drawing/2014/main" id="{B87D600B-3C67-4230-8A56-3DB81E995FD8}"/>
+              </a:ext>
+            </a:extLst>
+          </p:cNvPr>
+          <p:cNvSpPr txBox="1"/>
+          <p:nvPr/>
+        </p:nvSpPr>
+        <p:spPr>
+          <a:xfrm>
+            <a:off x="514458" y="3237269"/>
+            <a:ext cx="4784451" cy="430887"/>
+          </a:xfrm>
+          <a:prstGeom prst="rect">
+            <a:avLst/>
+          </a:prstGeom>
+          <a:noFill/>
+        </p:spPr>
+        <p:txBody>
+          <a:bodyPr wrap="none" rtlCol="0">
+            <a:spAutoFit/>
+          </a:bodyPr>
+          <a:lstStyle/>
+          <a:p>
+            <a:r>
+              <a:rPr lang="en-US" sz="2200" dirty="0" err="1"/>
+              <a:t>Lines_adjacency</a:t>
+            </a:r>
+            <a:r>
+              <a:rPr lang="en-US" sz="2200" dirty="0"/>
+              <a:t>, </a:t>
+            </a:r>
+            <a:r>
+              <a:rPr lang="en-US" sz="2200" dirty="0" err="1"/>
+              <a:t>line_strip_adjancency</a:t>
+            </a:r>
+            <a:r>
+              <a:rPr lang="en-US" sz="2200" dirty="0"/>
+              <a:t> </a:t>
+            </a:r>
+          </a:p>
+        </p:txBody>
+      </p:sp>
+      <p:sp>
+        <p:nvSpPr>
+          <p:cNvPr id="10" name="TextBox 9">
+            <a:extLst>
+              <a:ext uri="{FF2B5EF4-FFF2-40B4-BE49-F238E27FC236}">
+                <a16:creationId xmlns:a16="http://schemas.microsoft.com/office/drawing/2014/main" id="{8C59710C-75A6-4FD8-A6A4-735BBAF33E33}"/>
+              </a:ext>
+            </a:extLst>
+          </p:cNvPr>
+          <p:cNvSpPr txBox="1"/>
+          <p:nvPr/>
+        </p:nvSpPr>
+        <p:spPr>
+          <a:xfrm>
+            <a:off x="514458" y="6232416"/>
+            <a:ext cx="2515432" cy="430887"/>
+          </a:xfrm>
+          <a:prstGeom prst="rect">
+            <a:avLst/>
+          </a:prstGeom>
+          <a:noFill/>
+        </p:spPr>
+        <p:txBody>
+          <a:bodyPr wrap="none" rtlCol="0">
+            <a:spAutoFit/>
+          </a:bodyPr>
+          <a:lstStyle/>
+          <a:p>
+            <a:r>
+              <a:rPr lang="en-US" sz="2200" dirty="0" err="1"/>
+              <a:t>triangles_adjacency</a:t>
+            </a:r>
+            <a:r>
+              <a:rPr lang="en-US" sz="2200" dirty="0"/>
+              <a:t> </a:t>
+            </a:r>
+          </a:p>
+        </p:txBody>
+      </p:sp>
+      <p:sp>
+        <p:nvSpPr>
+          <p:cNvPr id="11" name="TextBox 10">
+            <a:extLst>
+              <a:ext uri="{FF2B5EF4-FFF2-40B4-BE49-F238E27FC236}">
+                <a16:creationId xmlns:a16="http://schemas.microsoft.com/office/drawing/2014/main" id="{FF06A8D4-2170-436A-B324-69E8D617ABF5}"/>
+              </a:ext>
+            </a:extLst>
+          </p:cNvPr>
+          <p:cNvSpPr txBox="1"/>
+          <p:nvPr/>
+        </p:nvSpPr>
+        <p:spPr>
+          <a:xfrm>
+            <a:off x="8228784" y="3752614"/>
+            <a:ext cx="3167919" cy="430887"/>
+          </a:xfrm>
+          <a:prstGeom prst="rect">
+            <a:avLst/>
+          </a:prstGeom>
+          <a:noFill/>
+        </p:spPr>
+        <p:txBody>
+          <a:bodyPr wrap="none" rtlCol="0">
+            <a:spAutoFit/>
+          </a:bodyPr>
+          <a:lstStyle/>
+          <a:p>
+            <a:r>
+              <a:rPr lang="en-US" sz="2200" dirty="0" err="1"/>
+              <a:t>triangles_strip_adjacency</a:t>
+            </a:r>
+            <a:r>
+              <a:rPr lang="en-US" sz="2200" dirty="0"/>
+              <a:t> </a:t>
+            </a:r>
+          </a:p>
+        </p:txBody>
+      </p:sp>
     </p:spTree>
     <p:extLst>
       <p:ext uri="{BB962C8B-B14F-4D97-AF65-F5344CB8AC3E}">
@@ -4992,7 +5177,7 @@
         </p:nvSpPr>
         <p:spPr>
           <a:xfrm>
-            <a:off x="0" y="2382080"/>
+            <a:off x="83128" y="2382080"/>
             <a:ext cx="7356764" cy="469756"/>
           </a:xfrm>
           <a:prstGeom prst="roundRect">
@@ -16133,10 +16318,10 @@
       </p:grpSpPr>
       <p:sp>
         <p:nvSpPr>
-          <p:cNvPr id="2" name="Title 1">
-            <a:extLst>
-              <a:ext uri="{FF2B5EF4-FFF2-40B4-BE49-F238E27FC236}">
-                <a16:creationId xmlns:a16="http://schemas.microsoft.com/office/drawing/2014/main" id="{7BEF9F16-C4CC-420D-9695-C4891AB74E05}"/>
+          <p:cNvPr id="7" name="Title 6">
+            <a:extLst>
+              <a:ext uri="{FF2B5EF4-FFF2-40B4-BE49-F238E27FC236}">
+                <a16:creationId xmlns:a16="http://schemas.microsoft.com/office/drawing/2014/main" id="{D2B9E3A7-D3B5-4549-9F58-0D419C4129FE}"/>
               </a:ext>
             </a:extLst>
           </p:cNvPr>
@@ -16152,105 +16337,55 @@
           <a:bodyPr/>
           <a:lstStyle/>
           <a:p>
-            <a:r>
-              <a:rPr lang="en-US" dirty="0" err="1"/>
-              <a:t>Lines_adjacency</a:t>
-            </a:r>
-            <a:r>
-              <a:rPr lang="en-US" dirty="0"/>
-              <a:t>, </a:t>
-            </a:r>
-            <a:r>
-              <a:rPr lang="en-US" dirty="0" err="1"/>
-              <a:t>triangles_adjacency</a:t>
-            </a:r>
-            <a:endParaRPr lang="en-US" dirty="0"/>
-          </a:p>
-        </p:txBody>
-      </p:sp>
-      <p:sp>
-        <p:nvSpPr>
-          <p:cNvPr id="3" name="Content Placeholder 2">
-            <a:extLst>
-              <a:ext uri="{FF2B5EF4-FFF2-40B4-BE49-F238E27FC236}">
-                <a16:creationId xmlns:a16="http://schemas.microsoft.com/office/drawing/2014/main" id="{2CD1EDEE-C5A5-4C14-9564-A75F0A2BED97}"/>
-              </a:ext>
-            </a:extLst>
-          </p:cNvPr>
-          <p:cNvSpPr>
-            <a:spLocks noGrp="1"/>
-          </p:cNvSpPr>
-          <p:nvPr>
-            <p:ph idx="1"/>
-          </p:nvPr>
-        </p:nvSpPr>
-        <p:spPr/>
-        <p:txBody>
-          <a:bodyPr/>
-          <a:lstStyle/>
-          <a:p>
             <a:endParaRPr lang="en-US"/>
           </a:p>
         </p:txBody>
       </p:sp>
       <p:pic>
         <p:nvPicPr>
-          <p:cNvPr id="4" name="Picture 3">
-            <a:extLst>
-              <a:ext uri="{FF2B5EF4-FFF2-40B4-BE49-F238E27FC236}">
-                <a16:creationId xmlns:a16="http://schemas.microsoft.com/office/drawing/2014/main" id="{1F43CD8F-E0E9-4244-ADE3-047FB42808BA}"/>
+          <p:cNvPr id="9" name="Picture 2" descr="http://i.msdn.microsoft.com/dynimg/IC520307.png">
+            <a:extLst>
+              <a:ext uri="{FF2B5EF4-FFF2-40B4-BE49-F238E27FC236}">
+                <a16:creationId xmlns:a16="http://schemas.microsoft.com/office/drawing/2014/main" id="{14629137-7482-4A88-9F46-B173A9DF643E}"/>
               </a:ext>
             </a:extLst>
           </p:cNvPr>
           <p:cNvPicPr>
-            <a:picLocks noChangeAspect="1"/>
+            <a:picLocks noChangeAspect="1" noChangeArrowheads="1"/>
           </p:cNvPicPr>
           <p:nvPr/>
         </p:nvPicPr>
         <p:blipFill>
-          <a:blip r:embed="rId2"/>
+          <a:blip r:embed="rId2">
+            <a:extLst>
+              <a:ext uri="{28A0092B-C50C-407E-A947-70E740481C1C}">
+                <a14:useLocalDpi xmlns:a14="http://schemas.microsoft.com/office/drawing/2010/main" val="0"/>
+              </a:ext>
+            </a:extLst>
+          </a:blip>
+          <a:srcRect/>
           <a:stretch>
             <a:fillRect/>
           </a:stretch>
         </p:blipFill>
-        <p:spPr>
-          <a:xfrm>
-            <a:off x="2533650" y="2976562"/>
-            <a:ext cx="7124700" cy="904875"/>
+        <p:spPr bwMode="auto">
+          <a:xfrm>
+            <a:off x="4100513" y="138113"/>
+            <a:ext cx="3990975" cy="6581775"/>
           </a:xfrm>
           <a:prstGeom prst="rect">
             <a:avLst/>
           </a:prstGeom>
-        </p:spPr>
-      </p:pic>
-      <p:pic>
-        <p:nvPicPr>
-          <p:cNvPr id="5" name="Picture 4">
-            <a:extLst>
-              <a:ext uri="{FF2B5EF4-FFF2-40B4-BE49-F238E27FC236}">
-                <a16:creationId xmlns:a16="http://schemas.microsoft.com/office/drawing/2014/main" id="{24DE7362-D133-4B55-A985-8697607853BD}"/>
-              </a:ext>
-            </a:extLst>
-          </p:cNvPr>
-          <p:cNvPicPr>
-            <a:picLocks noChangeAspect="1"/>
-          </p:cNvPicPr>
-          <p:nvPr/>
-        </p:nvPicPr>
-        <p:blipFill>
-          <a:blip r:embed="rId3"/>
-          <a:stretch>
-            <a:fillRect/>
-          </a:stretch>
-        </p:blipFill>
-        <p:spPr>
-          <a:xfrm>
-            <a:off x="2654877" y="4698855"/>
-            <a:ext cx="7277100" cy="847725"/>
-          </a:xfrm>
-          <a:prstGeom prst="rect">
-            <a:avLst/>
-          </a:prstGeom>
+          <a:noFill/>
+          <a:extLst>
+            <a:ext uri="{909E8E84-426E-40DD-AFC4-6F175D3DCCD1}">
+              <a14:hiddenFill xmlns:a14="http://schemas.microsoft.com/office/drawing/2010/main">
+                <a:solidFill>
+                  <a:srgbClr val="FFFFFF"/>
+                </a:solidFill>
+              </a14:hiddenFill>
+            </a:ext>
+          </a:extLst>
         </p:spPr>
       </p:pic>
     </p:spTree>

</xml_diff>